<commit_message>
FEAT:Project pre-finalized status update
</commit_message>
<xml_diff>
--- a/Review 1/Reveiw 1.pptx
+++ b/Review 1/Reveiw 1.pptx
@@ -116,6 +116,11 @@
       </a:defRPr>
     </a:lvl9pPr>
   </p:defaultTextStyle>
+  <p:extLst>
+    <p:ext uri="{EFAFB233-063F-42B5-8137-9DF3F51BA10A}">
+      <p15:sldGuideLst xmlns:p15="http://schemas.microsoft.com/office/powerpoint/2012/main"/>
+    </p:ext>
+  </p:extLst>
 </p:presentation>
 </file>
 
@@ -13338,13 +13343,13 @@
   <p:clrMapOvr>
     <a:masterClrMapping/>
   </p:clrMapOvr>
-  <mc:AlternateContent xmlns:mc="http://schemas.openxmlformats.org/markup-compatibility/2006">
-    <mc:Choice xmlns:p159="http://schemas.microsoft.com/office/powerpoint/2015/09/main" Requires="p159">
+  <mc:AlternateContent xmlns:mc="http://schemas.openxmlformats.org/markup-compatibility/2006" xmlns:p159="http://schemas.microsoft.com/office/powerpoint/2015/09/main">
+    <mc:Choice Requires="p159">
       <p:transition xmlns:p14="http://schemas.microsoft.com/office/powerpoint/2010/main" spd="slow" p14:dur="2000">
         <p159:morph option="byObject"/>
       </p:transition>
     </mc:Choice>
-    <mc:Fallback>
+    <mc:Fallback xmlns="">
       <p:transition spd="slow">
         <p:fade/>
       </p:transition>
@@ -14249,13 +14254,13 @@
   <p:clrMapOvr>
     <a:masterClrMapping/>
   </p:clrMapOvr>
-  <mc:AlternateContent xmlns:mc="http://schemas.openxmlformats.org/markup-compatibility/2006">
-    <mc:Choice xmlns:p159="http://schemas.microsoft.com/office/powerpoint/2015/09/main" Requires="p159">
+  <mc:AlternateContent xmlns:mc="http://schemas.openxmlformats.org/markup-compatibility/2006" xmlns:p159="http://schemas.microsoft.com/office/powerpoint/2015/09/main">
+    <mc:Choice Requires="p159">
       <p:transition xmlns:p14="http://schemas.microsoft.com/office/powerpoint/2010/main" spd="slow" p14:dur="2000">
         <p159:morph option="byObject"/>
       </p:transition>
     </mc:Choice>
-    <mc:Fallback>
+    <mc:Fallback xmlns="">
       <p:transition spd="slow">
         <p:fade/>
       </p:transition>
@@ -14386,13 +14391,13 @@
   <p:clrMapOvr>
     <a:masterClrMapping/>
   </p:clrMapOvr>
-  <mc:AlternateContent xmlns:mc="http://schemas.openxmlformats.org/markup-compatibility/2006">
-    <mc:Choice xmlns:p159="http://schemas.microsoft.com/office/powerpoint/2015/09/main" Requires="p159">
+  <mc:AlternateContent xmlns:mc="http://schemas.openxmlformats.org/markup-compatibility/2006" xmlns:p159="http://schemas.microsoft.com/office/powerpoint/2015/09/main">
+    <mc:Choice Requires="p159">
       <p:transition xmlns:p14="http://schemas.microsoft.com/office/powerpoint/2010/main" spd="slow" p14:dur="2000">
         <p159:morph option="byObject"/>
       </p:transition>
     </mc:Choice>
-    <mc:Fallback>
+    <mc:Fallback xmlns="">
       <p:transition spd="slow">
         <p:fade/>
       </p:transition>
@@ -14464,8 +14469,8 @@
         </p:nvSpPr>
         <p:spPr bwMode="auto">
           <a:xfrm>
-            <a:off x="759510" y="2642793"/>
-            <a:ext cx="10672979" cy="3693319"/>
+            <a:off x="764988" y="2412782"/>
+            <a:ext cx="10662023" cy="4031873"/>
           </a:xfrm>
           <a:prstGeom prst="rect">
             <a:avLst/>
@@ -14530,7 +14535,7 @@
               <a:tabLst/>
             </a:pPr>
             <a:r>
-              <a:rPr kumimoji="0" lang="en-US" altLang="en-US" sz="1800" b="1" i="0" u="none" strike="noStrike" cap="none" normalizeH="0" baseline="0" dirty="0">
+              <a:rPr kumimoji="0" lang="en-US" altLang="en-US" sz="1600" b="1" i="0" u="none" strike="noStrike" cap="none" normalizeH="0" baseline="0" dirty="0">
                 <a:ln>
                   <a:noFill/>
                 </a:ln>
@@ -14543,7 +14548,7 @@
               <a:t>M. Faridi </a:t>
             </a:r>
             <a:r>
-              <a:rPr kumimoji="0" lang="en-US" altLang="en-US" sz="1800" b="1" i="0" u="none" strike="noStrike" cap="none" normalizeH="0" baseline="0" dirty="0" err="1">
+              <a:rPr kumimoji="0" lang="en-US" altLang="en-US" sz="1600" b="1" i="0" u="none" strike="noStrike" cap="none" normalizeH="0" baseline="0" dirty="0" err="1">
                 <a:ln>
                   <a:noFill/>
                 </a:ln>
@@ -14556,7 +14561,7 @@
               <a:t>Masouleh</a:t>
             </a:r>
             <a:r>
-              <a:rPr kumimoji="0" lang="en-US" altLang="en-US" sz="1800" b="1" i="0" u="none" strike="noStrike" cap="none" normalizeH="0" baseline="0" dirty="0">
+              <a:rPr kumimoji="0" lang="en-US" altLang="en-US" sz="1600" b="1" i="0" u="none" strike="noStrike" cap="none" normalizeH="0" baseline="0" dirty="0">
                 <a:ln>
                   <a:noFill/>
                 </a:ln>
@@ -14569,7 +14574,7 @@
               <a:t> </a:t>
             </a:r>
             <a:r>
-              <a:rPr kumimoji="0" lang="en-US" altLang="en-US" sz="1800" b="1" i="1" u="none" strike="noStrike" cap="none" normalizeH="0" baseline="0" dirty="0">
+              <a:rPr kumimoji="0" lang="en-US" altLang="en-US" sz="1600" b="1" i="1" u="none" strike="noStrike" cap="none" normalizeH="0" baseline="0" dirty="0">
                 <a:ln>
                   <a:noFill/>
                 </a:ln>
@@ -14582,7 +14587,7 @@
               <a:t>et al</a:t>
             </a:r>
             <a:r>
-              <a:rPr kumimoji="0" lang="en-US" altLang="en-US" sz="1800" b="0" i="1" u="none" strike="noStrike" cap="none" normalizeH="0" baseline="0" dirty="0">
+              <a:rPr kumimoji="0" lang="en-US" altLang="en-US" sz="1600" b="0" i="1" u="none" strike="noStrike" cap="none" normalizeH="0" baseline="0" dirty="0">
                 <a:ln>
                   <a:noFill/>
                 </a:ln>
@@ -14595,7 +14600,7 @@
               <a:t>.</a:t>
             </a:r>
             <a:r>
-              <a:rPr kumimoji="0" lang="en-US" altLang="en-US" sz="1800" b="0" i="0" u="none" strike="noStrike" cap="none" normalizeH="0" baseline="0" dirty="0">
+              <a:rPr kumimoji="0" lang="en-US" altLang="en-US" sz="1600" b="0" i="0" u="none" strike="noStrike" cap="none" normalizeH="0" baseline="0" dirty="0">
                 <a:ln>
                   <a:noFill/>
                 </a:ln>
@@ -14608,7 +14613,7 @@
               <a:t>, “Optimization of ETL Process in Data Warehouse Through a Combination of Parallelization and Shared Cache Memory,” </a:t>
             </a:r>
             <a:r>
-              <a:rPr kumimoji="0" lang="en-US" altLang="en-US" sz="1800" b="0" i="1" u="none" strike="noStrike" cap="none" normalizeH="0" baseline="0" dirty="0">
+              <a:rPr kumimoji="0" lang="en-US" altLang="en-US" sz="1600" b="0" i="1" u="none" strike="noStrike" cap="none" normalizeH="0" baseline="0" dirty="0">
                 <a:ln>
                   <a:noFill/>
                 </a:ln>
@@ -14621,7 +14626,7 @@
               <a:t>Eng. Technol. Appl. Sci. Res.</a:t>
             </a:r>
             <a:r>
-              <a:rPr kumimoji="0" lang="en-US" altLang="en-US" sz="1800" b="0" i="0" u="none" strike="noStrike" cap="none" normalizeH="0" baseline="0" dirty="0">
+              <a:rPr kumimoji="0" lang="en-US" altLang="en-US" sz="1600" b="0" i="0" u="none" strike="noStrike" cap="none" normalizeH="0" baseline="0" dirty="0">
                 <a:ln>
                   <a:noFill/>
                 </a:ln>
@@ -14651,7 +14656,94 @@
               <a:buChar char="Ø"/>
               <a:tabLst/>
             </a:pPr>
-            <a:endParaRPr kumimoji="0" lang="en-US" altLang="en-US" sz="1800" b="0" i="0" u="none" strike="noStrike" cap="none" normalizeH="0" baseline="0" dirty="0">
+            <a:endParaRPr kumimoji="0" lang="en-US" altLang="en-US" sz="1600" b="0" i="0" u="none" strike="noStrike" cap="none" normalizeH="0" baseline="0" dirty="0">
+              <a:ln>
+                <a:noFill/>
+              </a:ln>
+              <a:solidFill>
+                <a:schemeClr val="tx1"/>
+              </a:solidFill>
+              <a:effectLst/>
+              <a:latin typeface="+mj-lt"/>
+            </a:endParaRPr>
+          </a:p>
+          <a:p>
+            <a:pPr defTabSz="914400" eaLnBrk="0" fontAlgn="base" hangingPunct="0">
+              <a:spcBef>
+                <a:spcPct val="0"/>
+              </a:spcBef>
+              <a:spcAft>
+                <a:spcPct val="0"/>
+              </a:spcAft>
+              <a:buClrTx/>
+              <a:buSzTx/>
+              <a:buFont typeface="Wingdings" panose="05000000000000000000" pitchFamily="2" charset="2"/>
+              <a:buChar char="Ø"/>
+            </a:pPr>
+            <a:r>
+              <a:rPr lang="en-GB" sz="1600" dirty="0"/>
+              <a:t>IEEE Research on Enterprise ETL and Data Warehousing</a:t>
+            </a:r>
+          </a:p>
+          <a:p>
+            <a:pPr defTabSz="914400" eaLnBrk="0" fontAlgn="base" hangingPunct="0">
+              <a:spcBef>
+                <a:spcPct val="0"/>
+              </a:spcBef>
+              <a:spcAft>
+                <a:spcPct val="0"/>
+              </a:spcAft>
+              <a:buClrTx/>
+              <a:buSzTx/>
+              <a:buFont typeface="Wingdings" panose="05000000000000000000" pitchFamily="2" charset="2"/>
+              <a:buChar char="Ø"/>
+            </a:pPr>
+            <a:endParaRPr lang="en-GB" sz="1600" dirty="0"/>
+          </a:p>
+          <a:p>
+            <a:pPr defTabSz="914400" eaLnBrk="0" fontAlgn="base" hangingPunct="0">
+              <a:spcBef>
+                <a:spcPct val="0"/>
+              </a:spcBef>
+              <a:spcAft>
+                <a:spcPct val="0"/>
+              </a:spcAft>
+              <a:buClrTx/>
+              <a:buSzTx/>
+              <a:buFont typeface="Wingdings" panose="05000000000000000000" pitchFamily="2" charset="2"/>
+              <a:buChar char="Ø"/>
+            </a:pPr>
+            <a:r>
+              <a:rPr lang="en-GB" sz="1600" b="1" dirty="0"/>
+              <a:t>William H. Inmon </a:t>
+            </a:r>
+            <a:r>
+              <a:rPr lang="en-GB" sz="1600" dirty="0"/>
+              <a:t>– </a:t>
+            </a:r>
+            <a:r>
+              <a:rPr lang="en-GB" sz="1600" i="1" dirty="0"/>
+              <a:t>Building the Data Warehouse</a:t>
+            </a:r>
+            <a:endParaRPr lang="en-GB" sz="1600" dirty="0"/>
+          </a:p>
+          <a:p>
+            <a:pPr marL="0" marR="0" lvl="0" indent="0" algn="l" defTabSz="914400" rtl="0" eaLnBrk="0" fontAlgn="base" latinLnBrk="0" hangingPunct="0">
+              <a:lnSpc>
+                <a:spcPct val="100000"/>
+              </a:lnSpc>
+              <a:spcBef>
+                <a:spcPct val="0"/>
+              </a:spcBef>
+              <a:spcAft>
+                <a:spcPct val="0"/>
+              </a:spcAft>
+              <a:buClrTx/>
+              <a:buSzTx/>
+              <a:buNone/>
+              <a:tabLst/>
+            </a:pPr>
+            <a:endParaRPr kumimoji="0" lang="en-US" altLang="en-US" sz="1600" b="0" i="0" u="none" strike="noStrike" cap="none" normalizeH="0" baseline="0" dirty="0">
               <a:ln>
                 <a:noFill/>
               </a:ln>
@@ -14680,7 +14772,7 @@
               <a:tabLst/>
             </a:pPr>
             <a:r>
-              <a:rPr kumimoji="0" lang="en-US" altLang="en-US" sz="1800" b="1" i="0" u="none" strike="noStrike" cap="none" normalizeH="0" baseline="0" dirty="0">
+              <a:rPr kumimoji="0" lang="en-US" altLang="en-US" sz="1600" b="1" i="0" u="none" strike="noStrike" cap="none" normalizeH="0" baseline="0" dirty="0">
                 <a:ln>
                   <a:noFill/>
                 </a:ln>
@@ -14693,7 +14785,7 @@
               <a:t>R. Kimball and M. Ross</a:t>
             </a:r>
             <a:r>
-              <a:rPr kumimoji="0" lang="en-US" altLang="en-US" sz="1800" b="0" i="0" u="none" strike="noStrike" cap="none" normalizeH="0" baseline="0" dirty="0">
+              <a:rPr kumimoji="0" lang="en-US" altLang="en-US" sz="1600" b="0" i="0" u="none" strike="noStrike" cap="none" normalizeH="0" baseline="0" dirty="0">
                 <a:ln>
                   <a:noFill/>
                 </a:ln>
@@ -14706,7 +14798,7 @@
               <a:t>, </a:t>
             </a:r>
             <a:r>
-              <a:rPr kumimoji="0" lang="en-US" altLang="en-US" sz="1800" b="0" i="1" u="none" strike="noStrike" cap="none" normalizeH="0" baseline="0" dirty="0">
+              <a:rPr kumimoji="0" lang="en-US" altLang="en-US" sz="1600" b="0" i="1" u="none" strike="noStrike" cap="none" normalizeH="0" baseline="0" dirty="0">
                 <a:ln>
                   <a:noFill/>
                 </a:ln>
@@ -14719,7 +14811,7 @@
               <a:t>The Data Warehouse Toolkit</a:t>
             </a:r>
             <a:r>
-              <a:rPr kumimoji="0" lang="en-US" altLang="en-US" sz="1800" b="0" i="0" u="none" strike="noStrike" cap="none" normalizeH="0" baseline="0" dirty="0">
+              <a:rPr kumimoji="0" lang="en-US" altLang="en-US" sz="1600" b="0" i="0" u="none" strike="noStrike" cap="none" normalizeH="0" baseline="0" dirty="0">
                 <a:ln>
                   <a:noFill/>
                 </a:ln>
@@ -14749,7 +14841,7 @@
               <a:buChar char="Ø"/>
               <a:tabLst/>
             </a:pPr>
-            <a:endParaRPr kumimoji="0" lang="en-US" altLang="en-US" sz="1800" b="0" i="0" u="none" strike="noStrike" cap="none" normalizeH="0" baseline="0" dirty="0">
+            <a:endParaRPr kumimoji="0" lang="en-US" altLang="en-US" sz="1600" b="0" i="0" u="none" strike="noStrike" cap="none" normalizeH="0" baseline="0" dirty="0">
               <a:ln>
                 <a:noFill/>
               </a:ln>
@@ -14778,7 +14870,7 @@
               <a:tabLst/>
             </a:pPr>
             <a:r>
-              <a:rPr kumimoji="0" lang="en-US" altLang="en-US" sz="1800" i="0" u="none" strike="noStrike" cap="none" normalizeH="0" baseline="0" dirty="0">
+              <a:rPr kumimoji="0" lang="en-US" altLang="en-US" sz="1600" i="0" u="none" strike="noStrike" cap="none" normalizeH="0" baseline="0" dirty="0">
                 <a:ln>
                   <a:noFill/>
                 </a:ln>
@@ -14791,7 +14883,7 @@
               <a:t>Microsoft, </a:t>
             </a:r>
             <a:r>
-              <a:rPr kumimoji="0" lang="en-US" altLang="en-US" sz="1800" i="1" u="none" strike="noStrike" cap="none" normalizeH="0" baseline="0" dirty="0">
+              <a:rPr kumimoji="0" lang="en-US" altLang="en-US" sz="1600" i="1" u="none" strike="noStrike" cap="none" normalizeH="0" baseline="0" dirty="0">
                 <a:ln>
                   <a:noFill/>
                 </a:ln>
@@ -14804,7 +14896,7 @@
               <a:t>“Hardware and software requirements for SQL Server 2022,”</a:t>
             </a:r>
             <a:r>
-              <a:rPr kumimoji="0" lang="en-US" altLang="en-US" sz="1800" i="0" u="none" strike="noStrike" cap="none" normalizeH="0" baseline="0" dirty="0">
+              <a:rPr kumimoji="0" lang="en-US" altLang="en-US" sz="1600" i="0" u="none" strike="noStrike" cap="none" normalizeH="0" baseline="0" dirty="0">
                 <a:ln>
                   <a:noFill/>
                 </a:ln>
@@ -14834,7 +14926,7 @@
               <a:buChar char="Ø"/>
               <a:tabLst/>
             </a:pPr>
-            <a:endParaRPr kumimoji="0" lang="en-US" altLang="en-US" sz="1800" b="0" i="0" u="none" strike="noStrike" cap="none" normalizeH="0" baseline="0" dirty="0">
+            <a:endParaRPr kumimoji="0" lang="en-US" altLang="en-US" sz="1600" b="0" i="0" u="none" strike="noStrike" cap="none" normalizeH="0" baseline="0" dirty="0">
               <a:ln>
                 <a:noFill/>
               </a:ln>
@@ -14863,7 +14955,7 @@
               <a:tabLst/>
             </a:pPr>
             <a:r>
-              <a:rPr kumimoji="0" lang="en-US" altLang="en-US" sz="1800" b="0" i="0" u="none" strike="noStrike" cap="none" normalizeH="0" baseline="0" dirty="0">
+              <a:rPr kumimoji="0" lang="en-US" altLang="en-US" sz="1600" b="0" i="0" u="none" strike="noStrike" cap="none" normalizeH="0" baseline="0" dirty="0">
                 <a:ln>
                   <a:noFill/>
                 </a:ln>
@@ -14876,7 +14968,7 @@
               <a:t>Microsoft Learn, </a:t>
             </a:r>
             <a:r>
-              <a:rPr kumimoji="0" lang="en-US" altLang="en-US" sz="1800" b="0" i="1" u="none" strike="noStrike" cap="none" normalizeH="0" baseline="0" dirty="0">
+              <a:rPr kumimoji="0" lang="en-US" altLang="en-US" sz="1600" b="0" i="1" u="none" strike="noStrike" cap="none" normalizeH="0" baseline="0" dirty="0">
                 <a:ln>
                   <a:noFill/>
                 </a:ln>
@@ -14889,7 +14981,7 @@
               <a:t>“Star schema overview and design”</a:t>
             </a:r>
             <a:r>
-              <a:rPr kumimoji="0" lang="en-US" altLang="en-US" sz="1800" b="0" i="0" u="none" strike="noStrike" cap="none" normalizeH="0" baseline="0" dirty="0">
+              <a:rPr kumimoji="0" lang="en-US" altLang="en-US" sz="1600" b="0" i="0" u="none" strike="noStrike" cap="none" normalizeH="0" baseline="0" dirty="0">
                 <a:ln>
                   <a:noFill/>
                 </a:ln>
@@ -14919,7 +15011,7 @@
               <a:buChar char="Ø"/>
               <a:tabLst/>
             </a:pPr>
-            <a:endParaRPr kumimoji="0" lang="en-US" altLang="en-US" sz="1800" b="0" i="0" u="none" strike="noStrike" cap="none" normalizeH="0" baseline="0" dirty="0">
+            <a:endParaRPr kumimoji="0" lang="en-US" altLang="en-US" sz="1600" b="0" i="0" u="none" strike="noStrike" cap="none" normalizeH="0" baseline="0" dirty="0">
               <a:ln>
                 <a:noFill/>
               </a:ln>
@@ -14948,7 +15040,7 @@
               <a:tabLst/>
             </a:pPr>
             <a:r>
-              <a:rPr kumimoji="0" lang="en-US" altLang="en-US" sz="1800" b="0" i="0" u="none" strike="noStrike" cap="none" normalizeH="0" baseline="0" dirty="0">
+              <a:rPr kumimoji="0" lang="en-US" altLang="en-US" sz="1600" b="0" i="0" u="none" strike="noStrike" cap="none" normalizeH="0" baseline="0" dirty="0">
                 <a:ln>
                   <a:noFill/>
                 </a:ln>
@@ -14961,7 +15053,7 @@
               <a:t>Python Software Foundation, </a:t>
             </a:r>
             <a:r>
-              <a:rPr kumimoji="0" lang="en-US" altLang="en-US" sz="1800" b="0" i="1" u="none" strike="noStrike" cap="none" normalizeH="0" baseline="0" dirty="0">
+              <a:rPr kumimoji="0" lang="en-US" altLang="en-US" sz="1600" b="0" i="1" u="none" strike="noStrike" cap="none" normalizeH="0" baseline="0" dirty="0">
                 <a:ln>
                   <a:noFill/>
                 </a:ln>
@@ -14974,7 +15066,7 @@
               <a:t>Python 3.x Documentation</a:t>
             </a:r>
             <a:r>
-              <a:rPr kumimoji="0" lang="en-US" altLang="en-US" sz="1800" b="0" i="0" u="none" strike="noStrike" cap="none" normalizeH="0" baseline="0" dirty="0">
+              <a:rPr kumimoji="0" lang="en-US" altLang="en-US" sz="1600" b="0" i="0" u="none" strike="noStrike" cap="none" normalizeH="0" baseline="0" dirty="0">
                 <a:ln>
                   <a:noFill/>
                 </a:ln>
@@ -15004,7 +15096,7 @@
               <a:buChar char="Ø"/>
               <a:tabLst/>
             </a:pPr>
-            <a:endParaRPr kumimoji="0" lang="en-US" altLang="en-US" sz="1800" b="0" i="0" u="none" strike="noStrike" cap="none" normalizeH="0" baseline="0" dirty="0">
+            <a:endParaRPr kumimoji="0" lang="en-US" altLang="en-US" sz="1600" b="0" i="0" u="none" strike="noStrike" cap="none" normalizeH="0" baseline="0" dirty="0">
               <a:ln>
                 <a:noFill/>
               </a:ln>
@@ -15033,7 +15125,7 @@
               <a:tabLst/>
             </a:pPr>
             <a:r>
-              <a:rPr kumimoji="0" lang="en-US" altLang="en-US" sz="1800" b="0" i="0" u="none" strike="noStrike" cap="none" normalizeH="0" baseline="0" dirty="0">
+              <a:rPr kumimoji="0" lang="en-US" altLang="en-US" sz="1600" b="0" i="0" u="none" strike="noStrike" cap="none" normalizeH="0" baseline="0" dirty="0">
                 <a:ln>
                   <a:noFill/>
                 </a:ln>
@@ -15058,13 +15150,13 @@
   <p:clrMapOvr>
     <a:masterClrMapping/>
   </p:clrMapOvr>
-  <mc:AlternateContent xmlns:mc="http://schemas.openxmlformats.org/markup-compatibility/2006">
-    <mc:Choice xmlns:p159="http://schemas.microsoft.com/office/powerpoint/2015/09/main" Requires="p159">
+  <mc:AlternateContent xmlns:mc="http://schemas.openxmlformats.org/markup-compatibility/2006" xmlns:p159="http://schemas.microsoft.com/office/powerpoint/2015/09/main">
+    <mc:Choice Requires="p159">
       <p:transition xmlns:p14="http://schemas.microsoft.com/office/powerpoint/2010/main" spd="slow" p14:dur="2000">
         <p159:morph option="byObject"/>
       </p:transition>
     </mc:Choice>
-    <mc:Fallback>
+    <mc:Fallback xmlns="">
       <p:transition spd="slow">
         <p:fade/>
       </p:transition>
@@ -15113,18 +15205,16 @@
         </p:spPr>
         <p:style>
           <a:lnRef idx="2">
-            <a:schemeClr val="accent1">
-              <a:shade val="15000"/>
-            </a:schemeClr>
+            <a:schemeClr val="dk1"/>
           </a:lnRef>
           <a:fillRef idx="1">
-            <a:schemeClr val="accent1"/>
+            <a:schemeClr val="lt1"/>
           </a:fillRef>
           <a:effectRef idx="0">
-            <a:schemeClr val="accent1"/>
+            <a:schemeClr val="dk1"/>
           </a:effectRef>
           <a:fontRef idx="minor">
-            <a:schemeClr val="lt1"/>
+            <a:schemeClr val="dk1"/>
           </a:fontRef>
         </p:style>
         <p:txBody>
@@ -15231,13 +15321,13 @@
   <p:clrMapOvr>
     <a:masterClrMapping/>
   </p:clrMapOvr>
-  <mc:AlternateContent xmlns:mc="http://schemas.openxmlformats.org/markup-compatibility/2006">
-    <mc:Choice xmlns:p159="http://schemas.microsoft.com/office/powerpoint/2015/09/main" Requires="p159">
+  <mc:AlternateContent xmlns:mc="http://schemas.openxmlformats.org/markup-compatibility/2006" xmlns:p159="http://schemas.microsoft.com/office/powerpoint/2015/09/main">
+    <mc:Choice Requires="p159">
       <p:transition xmlns:p14="http://schemas.microsoft.com/office/powerpoint/2010/main" spd="slow" p14:dur="2000">
         <p159:morph option="byObject"/>
       </p:transition>
     </mc:Choice>
-    <mc:Fallback>
+    <mc:Fallback xmlns="">
       <p:transition spd="slow">
         <p:fade/>
       </p:transition>
@@ -15361,13 +15451,13 @@
   <p:clrMapOvr>
     <a:masterClrMapping/>
   </p:clrMapOvr>
-  <mc:AlternateContent xmlns:mc="http://schemas.openxmlformats.org/markup-compatibility/2006">
-    <mc:Choice xmlns:p159="http://schemas.microsoft.com/office/powerpoint/2015/09/main" Requires="p159">
+  <mc:AlternateContent xmlns:mc="http://schemas.openxmlformats.org/markup-compatibility/2006" xmlns:p159="http://schemas.microsoft.com/office/powerpoint/2015/09/main">
+    <mc:Choice Requires="p159">
       <p:transition xmlns:p14="http://schemas.microsoft.com/office/powerpoint/2010/main" spd="slow" p14:dur="2000">
         <p159:morph option="byObject"/>
       </p:transition>
     </mc:Choice>
-    <mc:Fallback>
+    <mc:Fallback xmlns="">
       <p:transition spd="slow">
         <p:fade/>
       </p:transition>
@@ -15909,13 +15999,13 @@
   <p:clrMapOvr>
     <a:masterClrMapping/>
   </p:clrMapOvr>
-  <mc:AlternateContent xmlns:mc="http://schemas.openxmlformats.org/markup-compatibility/2006">
-    <mc:Choice xmlns:p159="http://schemas.microsoft.com/office/powerpoint/2015/09/main" Requires="p159">
+  <mc:AlternateContent xmlns:mc="http://schemas.openxmlformats.org/markup-compatibility/2006" xmlns:p159="http://schemas.microsoft.com/office/powerpoint/2015/09/main">
+    <mc:Choice Requires="p159">
       <p:transition xmlns:p14="http://schemas.microsoft.com/office/powerpoint/2010/main" spd="slow" p14:dur="2000">
         <p159:morph option="byObject"/>
       </p:transition>
     </mc:Choice>
-    <mc:Fallback>
+    <mc:Fallback xmlns="">
       <p:transition spd="slow">
         <p:fade/>
       </p:transition>
@@ -16333,13 +16423,13 @@
   <p:clrMapOvr>
     <a:masterClrMapping/>
   </p:clrMapOvr>
-  <mc:AlternateContent xmlns:mc="http://schemas.openxmlformats.org/markup-compatibility/2006">
-    <mc:Choice xmlns:p159="http://schemas.microsoft.com/office/powerpoint/2015/09/main" Requires="p159">
+  <mc:AlternateContent xmlns:mc="http://schemas.openxmlformats.org/markup-compatibility/2006" xmlns:p159="http://schemas.microsoft.com/office/powerpoint/2015/09/main">
+    <mc:Choice Requires="p159">
       <p:transition xmlns:p14="http://schemas.microsoft.com/office/powerpoint/2010/main" spd="slow" p14:dur="2000">
         <p159:morph option="byObject"/>
       </p:transition>
     </mc:Choice>
-    <mc:Fallback>
+    <mc:Fallback xmlns="">
       <p:transition spd="slow">
         <p:fade/>
       </p:transition>
@@ -16731,13 +16821,13 @@
   <p:clrMapOvr>
     <a:masterClrMapping/>
   </p:clrMapOvr>
-  <mc:AlternateContent xmlns:mc="http://schemas.openxmlformats.org/markup-compatibility/2006">
-    <mc:Choice xmlns:p159="http://schemas.microsoft.com/office/powerpoint/2015/09/main" Requires="p159">
+  <mc:AlternateContent xmlns:mc="http://schemas.openxmlformats.org/markup-compatibility/2006" xmlns:p159="http://schemas.microsoft.com/office/powerpoint/2015/09/main">
+    <mc:Choice Requires="p159">
       <p:transition xmlns:p14="http://schemas.microsoft.com/office/powerpoint/2010/main" spd="slow" p14:dur="2000">
         <p159:morph option="byObject"/>
       </p:transition>
     </mc:Choice>
-    <mc:Fallback>
+    <mc:Fallback xmlns="">
       <p:transition spd="slow">
         <p:fade/>
       </p:transition>
@@ -17203,13 +17293,13 @@
   <p:clrMapOvr>
     <a:masterClrMapping/>
   </p:clrMapOvr>
-  <mc:AlternateContent xmlns:mc="http://schemas.openxmlformats.org/markup-compatibility/2006">
-    <mc:Choice xmlns:p159="http://schemas.microsoft.com/office/powerpoint/2015/09/main" Requires="p159">
+  <mc:AlternateContent xmlns:mc="http://schemas.openxmlformats.org/markup-compatibility/2006" xmlns:p159="http://schemas.microsoft.com/office/powerpoint/2015/09/main">
+    <mc:Choice Requires="p159">
       <p:transition xmlns:p14="http://schemas.microsoft.com/office/powerpoint/2010/main" spd="slow" p14:dur="2000">
         <p159:morph option="byObject"/>
       </p:transition>
     </mc:Choice>
-    <mc:Fallback>
+    <mc:Fallback xmlns="">
       <p:transition spd="slow">
         <p:fade/>
       </p:transition>
@@ -17601,13 +17691,13 @@
   <p:clrMapOvr>
     <a:masterClrMapping/>
   </p:clrMapOvr>
-  <mc:AlternateContent xmlns:mc="http://schemas.openxmlformats.org/markup-compatibility/2006">
-    <mc:Choice xmlns:p159="http://schemas.microsoft.com/office/powerpoint/2015/09/main" Requires="p159">
+  <mc:AlternateContent xmlns:mc="http://schemas.openxmlformats.org/markup-compatibility/2006" xmlns:p159="http://schemas.microsoft.com/office/powerpoint/2015/09/main">
+    <mc:Choice Requires="p159">
       <p:transition xmlns:p14="http://schemas.microsoft.com/office/powerpoint/2010/main" spd="slow" p14:dur="2000">
         <p159:morph option="byObject"/>
       </p:transition>
     </mc:Choice>
-    <mc:Fallback>
+    <mc:Fallback xmlns="">
       <p:transition spd="slow">
         <p:fade/>
       </p:transition>
@@ -17936,13 +18026,13 @@
   <p:clrMapOvr>
     <a:masterClrMapping/>
   </p:clrMapOvr>
-  <mc:AlternateContent xmlns:mc="http://schemas.openxmlformats.org/markup-compatibility/2006">
-    <mc:Choice xmlns:p159="http://schemas.microsoft.com/office/powerpoint/2015/09/main" Requires="p159">
+  <mc:AlternateContent xmlns:mc="http://schemas.openxmlformats.org/markup-compatibility/2006" xmlns:p159="http://schemas.microsoft.com/office/powerpoint/2015/09/main">
+    <mc:Choice Requires="p159">
       <p:transition xmlns:p14="http://schemas.microsoft.com/office/powerpoint/2010/main" spd="slow" p14:dur="2000">
         <p159:morph option="byObject"/>
       </p:transition>
     </mc:Choice>
-    <mc:Fallback>
+    <mc:Fallback xmlns="">
       <p:transition spd="slow">
         <p:fade/>
       </p:transition>
@@ -18505,13 +18595,13 @@
   <p:clrMapOvr>
     <a:masterClrMapping/>
   </p:clrMapOvr>
-  <mc:AlternateContent xmlns:mc="http://schemas.openxmlformats.org/markup-compatibility/2006">
-    <mc:Choice xmlns:p159="http://schemas.microsoft.com/office/powerpoint/2015/09/main" Requires="p159">
+  <mc:AlternateContent xmlns:mc="http://schemas.openxmlformats.org/markup-compatibility/2006" xmlns:p159="http://schemas.microsoft.com/office/powerpoint/2015/09/main">
+    <mc:Choice Requires="p159">
       <p:transition xmlns:p14="http://schemas.microsoft.com/office/powerpoint/2010/main" spd="slow" p14:dur="2000">
         <p159:morph option="byObject"/>
       </p:transition>
     </mc:Choice>
-    <mc:Fallback>
+    <mc:Fallback xmlns="">
       <p:transition spd="slow">
         <p:fade/>
       </p:transition>

</xml_diff>